<commit_message>
Changed Slides again submitted copy
</commit_message>
<xml_diff>
--- a/Final_Presentation/Slides.pptx
+++ b/Final_Presentation/Slides.pptx
@@ -849,8 +849,8 @@
         </p:nvSpPr>
         <p:spPr>
           <a:xfrm>
-            <a:off x="1143225" y="685800"/>
-            <a:ext cx="4572299" cy="3429000"/>
+            <a:off x="1143000" y="685800"/>
+            <a:ext cx="4572000" cy="3429000"/>
           </a:xfrm>
           <a:custGeom>
             <a:avLst/>
@@ -944,8 +944,8 @@
         </p:nvSpPr>
         <p:spPr>
           <a:xfrm>
-            <a:off x="1143225" y="685800"/>
-            <a:ext cx="4572299" cy="3429000"/>
+            <a:off x="1143000" y="685800"/>
+            <a:ext cx="4572000" cy="3429000"/>
           </a:xfrm>
           <a:custGeom>
             <a:avLst/>
@@ -1134,8 +1134,8 @@
         </p:nvSpPr>
         <p:spPr>
           <a:xfrm>
-            <a:off x="1143225" y="685800"/>
-            <a:ext cx="4572299" cy="3429000"/>
+            <a:off x="1143000" y="685800"/>
+            <a:ext cx="4572000" cy="3429000"/>
           </a:xfrm>
           <a:custGeom>
             <a:avLst/>
@@ -3884,7 +3884,7 @@
         <p:spPr>
           <a:xfrm>
             <a:off x="457200" y="1371600"/>
-            <a:ext cx="8229600" cy="4967700"/>
+            <a:ext cx="8229600" cy="3939510"/>
           </a:xfrm>
           <a:prstGeom prst="rect">
             <a:avLst/>
@@ -3900,19 +3900,22 @@
               <a:buNone/>
             </a:pPr>
             <a:r>
-              <a:rPr lang="en" dirty="0"/>
+              <a:rPr lang="en" sz="2400" dirty="0"/>
               <a:t>- Determine the result of a chess endgame position.</a:t>
             </a:r>
           </a:p>
           <a:p>
-            <a:endParaRPr dirty="0"/>
+            <a:pPr>
+              <a:buNone/>
+            </a:pPr>
+            <a:endParaRPr sz="1800" dirty="0"/>
           </a:p>
           <a:p>
             <a:pPr lvl="0" rtl="0">
               <a:buNone/>
             </a:pPr>
             <a:r>
-              <a:rPr lang="en" dirty="0"/>
+              <a:rPr lang="en" sz="2400" dirty="0"/>
               <a:t>- Usually formulated as a search problem.</a:t>
             </a:r>
           </a:p>
@@ -3921,36 +3924,104 @@
               <a:buNone/>
             </a:pPr>
             <a:r>
-              <a:rPr lang="en" dirty="0"/>
+              <a:rPr lang="en" sz="2400" dirty="0"/>
               <a:t>	- Slow because tree grows exponentially.</a:t>
             </a:r>
           </a:p>
           <a:p>
-            <a:endParaRPr dirty="0"/>
+            <a:pPr>
+              <a:buNone/>
+            </a:pPr>
+            <a:endParaRPr sz="1800" dirty="0"/>
           </a:p>
           <a:p>
             <a:pPr lvl="0" rtl="0">
               <a:buNone/>
             </a:pPr>
             <a:r>
-              <a:rPr lang="en" dirty="0"/>
-              <a:t>- We wanted to use a classification approach.</a:t>
-            </a:r>
-          </a:p>
-          <a:p>
-            <a:endParaRPr dirty="0"/>
+              <a:rPr lang="en" sz="2400" dirty="0" smtClean="0"/>
+              <a:t>- We </a:t>
+            </a:r>
+            <a:r>
+              <a:rPr lang="en" sz="2400" dirty="0"/>
+              <a:t>wanted to use a classification approach</a:t>
+            </a:r>
+            <a:r>
+              <a:rPr lang="en" sz="2400" dirty="0" smtClean="0"/>
+              <a:t>.</a:t>
+            </a:r>
+          </a:p>
+          <a:p>
+            <a:pPr lvl="0" rtl="0">
+              <a:buNone/>
+            </a:pPr>
+            <a:endParaRPr sz="1800" dirty="0"/>
           </a:p>
           <a:p>
             <a:pPr>
               <a:buNone/>
             </a:pPr>
             <a:r>
-              <a:rPr lang="en" dirty="0"/>
-              <a:t>- Found a UCI King-Rook vs. King dataset.</a:t>
-            </a:r>
+              <a:rPr lang="en" sz="2400" dirty="0" smtClean="0"/>
+              <a:t>- Found </a:t>
+            </a:r>
+            <a:r>
+              <a:rPr lang="en" sz="2400" dirty="0"/>
+              <a:t>a </a:t>
+            </a:r>
+            <a:r>
+              <a:rPr lang="en" sz="2400" dirty="0" smtClean="0"/>
+              <a:t>Multi-Class UCI </a:t>
+            </a:r>
+            <a:r>
+              <a:rPr lang="en" sz="2400" dirty="0"/>
+              <a:t>King-Rook vs. King dataset</a:t>
+            </a:r>
+            <a:r>
+              <a:rPr lang="en" sz="2400" dirty="0" smtClean="0"/>
+              <a:t>.</a:t>
+            </a:r>
+          </a:p>
+          <a:p>
+            <a:pPr>
+              <a:buNone/>
+            </a:pPr>
+            <a:r>
+              <a:rPr lang="en" sz="2400" dirty="0" smtClean="0"/>
+              <a:t>   </a:t>
+            </a:r>
+            <a:endParaRPr lang="en" sz="2400" dirty="0"/>
           </a:p>
         </p:txBody>
       </p:sp>
+      <p:pic>
+        <p:nvPicPr>
+          <p:cNvPr id="6" name="Picture 5" descr="addin_tmp.png"/>
+          <p:cNvPicPr>
+            <a:picLocks noChangeAspect="1"/>
+          </p:cNvPicPr>
+          <p:nvPr>
+            <p:custDataLst>
+              <p:tags r:id="rId1"/>
+            </p:custDataLst>
+          </p:nvPr>
+        </p:nvPicPr>
+        <p:blipFill>
+          <a:blip r:embed="rId4"/>
+          <a:stretch>
+            <a:fillRect/>
+          </a:stretch>
+        </p:blipFill>
+        <p:spPr>
+          <a:xfrm>
+            <a:off x="1066800" y="4953000"/>
+            <a:ext cx="2856951" cy="762000"/>
+          </a:xfrm>
+          <a:prstGeom prst="rect">
+            <a:avLst/>
+          </a:prstGeom>
+        </p:spPr>
+      </p:pic>
     </p:spTree>
   </p:cSld>
   <p:clrMapOvr>
@@ -3959,6 +4030,13 @@
   <p:transition spd="slow">
     <p:cut/>
   </p:transition>
+  <p:timing>
+    <p:tnLst>
+      <p:par>
+        <p:cTn id="1" dur="indefinite" restart="never" nodeType="tmRoot"/>
+      </p:par>
+    </p:tnLst>
+  </p:timing>
 </p:sld>
 </file>
 
@@ -4163,8 +4241,8 @@
         </p:nvSpPr>
         <p:spPr>
           <a:xfrm>
-            <a:off x="457200" y="1371600"/>
-            <a:ext cx="8229600" cy="5201394"/>
+            <a:off x="457200" y="1066800"/>
+            <a:ext cx="8229600" cy="5370671"/>
           </a:xfrm>
           <a:prstGeom prst="rect">
             <a:avLst/>
@@ -4203,11 +4281,18 @@
             </a:r>
             <a:r>
               <a:rPr lang="en" sz="2400" dirty="0"/>
-              <a:t>Used successfully on a similar dataset.</a:t>
-            </a:r>
-          </a:p>
-          <a:p>
-            <a:endParaRPr dirty="0"/>
+              <a:t>Used successfully on a similar dataset</a:t>
+            </a:r>
+            <a:r>
+              <a:rPr lang="en" sz="2400" dirty="0" smtClean="0"/>
+              <a:t>.</a:t>
+            </a:r>
+          </a:p>
+          <a:p>
+            <a:pPr lvl="0" rtl="0">
+              <a:buNone/>
+            </a:pPr>
+            <a:endParaRPr sz="1800" dirty="0"/>
           </a:p>
           <a:p>
             <a:pPr lvl="0" rtl="0">
@@ -4224,19 +4309,43 @@
             </a:pPr>
             <a:r>
               <a:rPr lang="en" sz="2400" dirty="0"/>
-              <a:t>	- Strong general-purpose algorithm.</a:t>
-            </a:r>
-          </a:p>
-          <a:p>
-            <a:endParaRPr dirty="0"/>
+              <a:t>	- Strong general-purpose algorithm</a:t>
+            </a:r>
+            <a:r>
+              <a:rPr lang="en" sz="2400" dirty="0" smtClean="0"/>
+              <a:t>.</a:t>
+            </a:r>
           </a:p>
           <a:p>
             <a:pPr lvl="0" rtl="0">
               <a:buNone/>
             </a:pPr>
             <a:r>
+              <a:rPr lang="en" sz="2400" dirty="0" smtClean="0"/>
+              <a:t>	- Learn about Sub-Gradient Projections</a:t>
+            </a:r>
+          </a:p>
+          <a:p>
+            <a:pPr lvl="0" rtl="0">
+              <a:buNone/>
+            </a:pPr>
+            <a:r>
+              <a:rPr lang="en" sz="2400" dirty="0" smtClean="0"/>
+              <a:t>	 </a:t>
+            </a:r>
+            <a:endParaRPr lang="en" sz="2400" dirty="0"/>
+          </a:p>
+          <a:p>
+            <a:pPr lvl="0" rtl="0">
+              <a:buNone/>
+            </a:pPr>
+            <a:r>
+              <a:rPr lang="en" sz="2400" dirty="0" smtClean="0"/>
+              <a:t>- </a:t>
+            </a:r>
+            <a:r>
               <a:rPr lang="en" sz="2400" dirty="0"/>
-              <a:t>- Redefined </a:t>
+              <a:t>Redefined </a:t>
             </a:r>
             <a:r>
               <a:rPr lang="en" sz="2400" dirty="0" smtClean="0"/>
@@ -4348,8 +4457,8 @@
         </p:nvSpPr>
         <p:spPr>
           <a:xfrm>
-            <a:off x="457200" y="1600200"/>
-            <a:ext cx="8229600" cy="4967700"/>
+            <a:off x="304800" y="1325494"/>
+            <a:ext cx="8229600" cy="4770506"/>
           </a:xfrm>
           <a:prstGeom prst="rect">
             <a:avLst/>
@@ -4365,19 +4474,36 @@
               <a:buNone/>
             </a:pPr>
             <a:r>
-              <a:rPr lang="en" sz="2400"/>
-              <a:t>- Original parameterization with row and column locations of individual pieces uninformative.</a:t>
-            </a:r>
-          </a:p>
-          <a:p>
-            <a:endParaRPr/>
+              <a:rPr lang="en" sz="2400" dirty="0" smtClean="0"/>
+              <a:t>- Original </a:t>
+            </a:r>
+            <a:r>
+              <a:rPr lang="en" sz="2400" dirty="0"/>
+              <a:t>parameterization with row and column locations of individual pieces uninformative</a:t>
+            </a:r>
+            <a:r>
+              <a:rPr lang="en" sz="2400" dirty="0" smtClean="0"/>
+              <a:t>.</a:t>
+            </a:r>
           </a:p>
           <a:p>
             <a:pPr lvl="0" rtl="0">
               <a:buNone/>
             </a:pPr>
-            <a:r>
-              <a:rPr lang="en" sz="2400"/>
+            <a:endParaRPr lang="en" sz="2400" dirty="0"/>
+          </a:p>
+          <a:p>
+            <a:pPr>
+              <a:buNone/>
+            </a:pPr>
+            <a:endParaRPr sz="1800" dirty="0"/>
+          </a:p>
+          <a:p>
+            <a:pPr lvl="0" rtl="0">
+              <a:buNone/>
+            </a:pPr>
+            <a:r>
+              <a:rPr lang="en" sz="2400" dirty="0"/>
               <a:t>- Reparameterized in terms of spatial relationships, just like real chess players do!</a:t>
             </a:r>
           </a:p>
@@ -4386,8 +4512,16 @@
               <a:buNone/>
             </a:pPr>
             <a:r>
-              <a:rPr lang="en" sz="2400"/>
-              <a:t>	- Distance of black king to corner.</a:t>
+              <a:rPr lang="en" sz="2400" dirty="0"/>
+              <a:t>	- Distance of black king to </a:t>
+            </a:r>
+            <a:r>
+              <a:rPr lang="en" sz="2400" dirty="0" smtClean="0"/>
+              <a:t>nearest corner</a:t>
+            </a:r>
+            <a:r>
+              <a:rPr lang="en" sz="2400" dirty="0"/>
+              <a:t>.</a:t>
             </a:r>
           </a:p>
           <a:p>
@@ -4395,8 +4529,16 @@
               <a:buNone/>
             </a:pPr>
             <a:r>
-              <a:rPr lang="en" sz="2400"/>
-              <a:t>	- Distance of black king to edge.</a:t>
+              <a:rPr lang="en" sz="2400" dirty="0"/>
+              <a:t>	- Distance of black king to </a:t>
+            </a:r>
+            <a:r>
+              <a:rPr lang="en" sz="2400" dirty="0" smtClean="0"/>
+              <a:t>nearest edge</a:t>
+            </a:r>
+            <a:r>
+              <a:rPr lang="en" sz="2400" dirty="0"/>
+              <a:t>.</a:t>
             </a:r>
           </a:p>
           <a:p>
@@ -4404,7 +4546,7 @@
               <a:buNone/>
             </a:pPr>
             <a:r>
-              <a:rPr lang="en" sz="2400"/>
+              <a:rPr lang="en" sz="2400" dirty="0"/>
               <a:t>	- Distance between black king and white king.</a:t>
             </a:r>
           </a:p>
@@ -4413,7 +4555,7 @@
               <a:buNone/>
             </a:pPr>
             <a:r>
-              <a:rPr lang="en" sz="2400"/>
+              <a:rPr lang="en" sz="2400" dirty="0"/>
               <a:t>	- Is position drawn?</a:t>
             </a:r>
           </a:p>
@@ -4422,12 +4564,180 @@
               <a:buNone/>
             </a:pPr>
             <a:r>
-              <a:rPr lang="en" sz="2400"/>
+              <a:rPr lang="en" sz="2400" dirty="0"/>
               <a:t>	- Is position checkmate?</a:t>
             </a:r>
           </a:p>
         </p:txBody>
       </p:sp>
+      <p:pic>
+        <p:nvPicPr>
+          <p:cNvPr id="4" name="Picture 3" descr="addin_tmp.png"/>
+          <p:cNvPicPr>
+            <a:picLocks noChangeAspect="1"/>
+          </p:cNvPicPr>
+          <p:nvPr>
+            <p:custDataLst>
+              <p:tags r:id="rId1"/>
+            </p:custDataLst>
+          </p:nvPr>
+        </p:nvPicPr>
+        <p:blipFill>
+          <a:blip r:embed="rId9"/>
+          <a:stretch>
+            <a:fillRect/>
+          </a:stretch>
+        </p:blipFill>
+        <p:spPr>
+          <a:xfrm>
+            <a:off x="7136130" y="3763894"/>
+            <a:ext cx="1626870" cy="308610"/>
+          </a:xfrm>
+          <a:prstGeom prst="rect">
+            <a:avLst/>
+          </a:prstGeom>
+        </p:spPr>
+      </p:pic>
+      <p:pic>
+        <p:nvPicPr>
+          <p:cNvPr id="7" name="Picture 6" descr="addin_tmp.png"/>
+          <p:cNvPicPr>
+            <a:picLocks noChangeAspect="1"/>
+          </p:cNvPicPr>
+          <p:nvPr>
+            <p:custDataLst>
+              <p:tags r:id="rId2"/>
+            </p:custDataLst>
+          </p:nvPr>
+        </p:nvPicPr>
+        <p:blipFill>
+          <a:blip r:embed="rId10"/>
+          <a:stretch>
+            <a:fillRect/>
+          </a:stretch>
+        </p:blipFill>
+        <p:spPr>
+          <a:xfrm>
+            <a:off x="7155180" y="4221094"/>
+            <a:ext cx="1423035" cy="308610"/>
+          </a:xfrm>
+          <a:prstGeom prst="rect">
+            <a:avLst/>
+          </a:prstGeom>
+        </p:spPr>
+      </p:pic>
+      <p:pic>
+        <p:nvPicPr>
+          <p:cNvPr id="10" name="Picture 9" descr="addin_tmp.png"/>
+          <p:cNvPicPr>
+            <a:picLocks noChangeAspect="1"/>
+          </p:cNvPicPr>
+          <p:nvPr>
+            <p:custDataLst>
+              <p:tags r:id="rId3"/>
+            </p:custDataLst>
+          </p:nvPr>
+        </p:nvPicPr>
+        <p:blipFill>
+          <a:blip r:embed="rId11"/>
+          <a:stretch>
+            <a:fillRect/>
+          </a:stretch>
+        </p:blipFill>
+        <p:spPr>
+          <a:xfrm>
+            <a:off x="7136130" y="4754494"/>
+            <a:ext cx="1303020" cy="308610"/>
+          </a:xfrm>
+          <a:prstGeom prst="rect">
+            <a:avLst/>
+          </a:prstGeom>
+        </p:spPr>
+      </p:pic>
+      <p:pic>
+        <p:nvPicPr>
+          <p:cNvPr id="12" name="Picture 11" descr="addin_tmp.png"/>
+          <p:cNvPicPr>
+            <a:picLocks noChangeAspect="1"/>
+          </p:cNvPicPr>
+          <p:nvPr>
+            <p:custDataLst>
+              <p:tags r:id="rId4"/>
+            </p:custDataLst>
+          </p:nvPr>
+        </p:nvPicPr>
+        <p:blipFill>
+          <a:blip r:embed="rId12"/>
+          <a:stretch>
+            <a:fillRect/>
+          </a:stretch>
+        </p:blipFill>
+        <p:spPr>
+          <a:xfrm>
+            <a:off x="7136130" y="5297419"/>
+            <a:ext cx="843915" cy="219075"/>
+          </a:xfrm>
+          <a:prstGeom prst="rect">
+            <a:avLst/>
+          </a:prstGeom>
+        </p:spPr>
+      </p:pic>
+      <p:pic>
+        <p:nvPicPr>
+          <p:cNvPr id="14" name="Picture 13" descr="addin_tmp.png"/>
+          <p:cNvPicPr>
+            <a:picLocks noChangeAspect="1"/>
+          </p:cNvPicPr>
+          <p:nvPr>
+            <p:custDataLst>
+              <p:tags r:id="rId5"/>
+            </p:custDataLst>
+          </p:nvPr>
+        </p:nvPicPr>
+        <p:blipFill>
+          <a:blip r:embed="rId13"/>
+          <a:stretch>
+            <a:fillRect/>
+          </a:stretch>
+        </p:blipFill>
+        <p:spPr>
+          <a:xfrm>
+            <a:off x="7136130" y="5668894"/>
+            <a:ext cx="657225" cy="219075"/>
+          </a:xfrm>
+          <a:prstGeom prst="rect">
+            <a:avLst/>
+          </a:prstGeom>
+        </p:spPr>
+      </p:pic>
+      <p:pic>
+        <p:nvPicPr>
+          <p:cNvPr id="18" name="Picture 17" descr="addin_tmp.png"/>
+          <p:cNvPicPr>
+            <a:picLocks noChangeAspect="1"/>
+          </p:cNvPicPr>
+          <p:nvPr>
+            <p:custDataLst>
+              <p:tags r:id="rId6"/>
+            </p:custDataLst>
+          </p:nvPr>
+        </p:nvPicPr>
+        <p:blipFill>
+          <a:blip r:embed="rId14"/>
+          <a:stretch>
+            <a:fillRect/>
+          </a:stretch>
+        </p:blipFill>
+        <p:spPr>
+          <a:xfrm>
+            <a:off x="762000" y="2362201"/>
+            <a:ext cx="4112771" cy="380999"/>
+          </a:xfrm>
+          <a:prstGeom prst="rect">
+            <a:avLst/>
+          </a:prstGeom>
+        </p:spPr>
+      </p:pic>
     </p:spTree>
   </p:cSld>
   <p:clrMapOvr>
@@ -4436,6 +4746,13 @@
   <p:transition spd="slow">
     <p:cut/>
   </p:transition>
+  <p:timing>
+    <p:tnLst>
+      <p:par>
+        <p:cTn id="1" dur="indefinite" restart="never" nodeType="tmRoot"/>
+      </p:par>
+    </p:tnLst>
+  </p:timing>
 </p:sld>
 </file>
 
@@ -4504,7 +4821,7 @@
         <p:spPr>
           <a:xfrm>
             <a:off x="457200" y="1600200"/>
-            <a:ext cx="8229600" cy="4967700"/>
+            <a:ext cx="8229600" cy="3939510"/>
           </a:xfrm>
           <a:prstGeom prst="rect">
             <a:avLst/>
@@ -4520,43 +4837,52 @@
               <a:buNone/>
             </a:pPr>
             <a:r>
-              <a:rPr lang="en" sz="2700" dirty="0"/>
+              <a:rPr lang="en" sz="2400" dirty="0"/>
               <a:t>- Very fast.</a:t>
             </a:r>
           </a:p>
           <a:p>
-            <a:endParaRPr dirty="0"/>
+            <a:pPr>
+              <a:buNone/>
+            </a:pPr>
+            <a:endParaRPr sz="1800" dirty="0"/>
           </a:p>
           <a:p>
             <a:pPr lvl="0" rtl="0">
               <a:buNone/>
             </a:pPr>
             <a:r>
-              <a:rPr lang="en" sz="2700" dirty="0"/>
+              <a:rPr lang="en" sz="2400" dirty="0"/>
               <a:t>- Split using maximum information gain at each node.</a:t>
             </a:r>
           </a:p>
           <a:p>
-            <a:endParaRPr dirty="0"/>
+            <a:pPr>
+              <a:buNone/>
+            </a:pPr>
+            <a:endParaRPr sz="1800" dirty="0"/>
           </a:p>
           <a:p>
             <a:pPr lvl="0" rtl="0">
               <a:buNone/>
             </a:pPr>
             <a:r>
-              <a:rPr lang="en" sz="2700" dirty="0"/>
+              <a:rPr lang="en" sz="2400" dirty="0"/>
               <a:t>- Original parameterization massively overfits data.</a:t>
             </a:r>
           </a:p>
           <a:p>
-            <a:endParaRPr dirty="0"/>
+            <a:pPr>
+              <a:buNone/>
+            </a:pPr>
+            <a:endParaRPr sz="1800" dirty="0"/>
           </a:p>
           <a:p>
             <a:pPr lvl="0" rtl="0">
               <a:buNone/>
             </a:pPr>
             <a:r>
-              <a:rPr lang="en" sz="2700" dirty="0"/>
+              <a:rPr lang="en" sz="2400" dirty="0"/>
               <a:t>- Reparameterization performs well using validation.</a:t>
             </a:r>
           </a:p>
@@ -4565,18 +4891,28 @@
               <a:buNone/>
             </a:pPr>
             <a:r>
-              <a:rPr lang="en" sz="2700" dirty="0"/>
-              <a:t>- Mean error: 1.07</a:t>
-            </a:r>
+              <a:rPr lang="en" sz="2400" dirty="0" smtClean="0"/>
+              <a:t>Mean </a:t>
+            </a:r>
+            <a:r>
+              <a:rPr lang="en" sz="2400" dirty="0"/>
+              <a:t>error: </a:t>
+            </a:r>
+            <a:r>
+              <a:rPr lang="en" sz="2400" dirty="0" smtClean="0"/>
+              <a:t>	1.07</a:t>
+            </a:r>
+            <a:endParaRPr lang="en" sz="2400" dirty="0"/>
           </a:p>
           <a:p>
             <a:pPr indent="457200">
               <a:buNone/>
             </a:pPr>
             <a:r>
-              <a:rPr lang="en" sz="2700" dirty="0"/>
-              <a:t>- Std: 1.45</a:t>
-            </a:r>
+              <a:rPr lang="en" sz="2400" dirty="0" smtClean="0"/>
+              <a:t>Std error:	1.45</a:t>
+            </a:r>
+            <a:endParaRPr lang="en" sz="2400" dirty="0"/>
           </a:p>
         </p:txBody>
       </p:sp>
@@ -4682,11 +5018,27 @@
                 <a:schemeClr val="dk1"/>
               </a:buClr>
               <a:buSzPct val="166666"/>
-              <a:buFont typeface="Arial"/>
-              <a:buChar char="•"/>
               <a:tabLst/>
               <a:defRPr/>
             </a:pPr>
+            <a:r>
+              <a:rPr kumimoji="0" lang="en-US" sz="2000" b="1" i="0" u="none" strike="noStrike" kern="0" cap="none" spc="0" normalizeH="0" baseline="0" noProof="0" dirty="0" smtClean="0">
+                <a:ln>
+                  <a:noFill/>
+                </a:ln>
+                <a:solidFill>
+                  <a:schemeClr val="dk1"/>
+                </a:solidFill>
+                <a:effectLst/>
+                <a:uLnTx/>
+                <a:uFillTx/>
+                <a:latin typeface="Arial"/>
+                <a:ea typeface="Arial"/>
+                <a:cs typeface="Arial"/>
+                <a:sym typeface="Arial"/>
+              </a:rPr>
+              <a:t>- </a:t>
+            </a:r>
             <a:r>
               <a:rPr kumimoji="0" lang="en-US" sz="2000" b="1" i="0" u="none" strike="noStrike" kern="0" cap="none" spc="0" normalizeH="0" baseline="0" noProof="0" dirty="0" err="1" smtClean="0">
                 <a:ln>
@@ -4943,8 +5295,6 @@
                 <a:schemeClr val="dk1"/>
               </a:buClr>
               <a:buSzPct val="166666"/>
-              <a:buFont typeface="Arial"/>
-              <a:buChar char="•"/>
               <a:tabLst/>
               <a:defRPr/>
             </a:pPr>
@@ -4964,8 +5314,23 @@
                 <a:cs typeface="Arial"/>
                 <a:sym typeface="Arial"/>
               </a:rPr>
-              <a:t>LIBSVM</a:t>
-            </a:r>
+              <a:t>- LIBSVM</a:t>
+            </a:r>
+            <a:endParaRPr kumimoji="0" lang="en-US" sz="2000" b="1" i="0" u="none" strike="noStrike" kern="0" cap="none" spc="0" normalizeH="0" baseline="0" noProof="0" dirty="0" smtClean="0">
+              <a:ln>
+                <a:noFill/>
+              </a:ln>
+              <a:solidFill>
+                <a:schemeClr val="dk1"/>
+              </a:solidFill>
+              <a:effectLst/>
+              <a:uLnTx/>
+              <a:uFillTx/>
+              <a:latin typeface="Arial"/>
+              <a:ea typeface="Arial"/>
+              <a:cs typeface="Arial"/>
+              <a:sym typeface="Arial"/>
+            </a:endParaRPr>
           </a:p>
           <a:p>
             <a:pPr marL="742950" marR="0" lvl="1" indent="-285750" algn="l" defTabSz="914400" rtl="0" eaLnBrk="1" fontAlgn="auto" latinLnBrk="0" hangingPunct="1">
@@ -5857,7 +6222,7 @@
         <p:spPr>
           <a:xfrm>
             <a:off x="457200" y="1600200"/>
-            <a:ext cx="8229600" cy="4967700"/>
+            <a:ext cx="8229600" cy="4216509"/>
           </a:xfrm>
           <a:prstGeom prst="rect">
             <a:avLst/>
@@ -5873,43 +6238,52 @@
               <a:buNone/>
             </a:pPr>
             <a:r>
-              <a:rPr lang="en" sz="2400"/>
+              <a:rPr lang="en" sz="2400" dirty="0"/>
               <a:t>- Reparameterizations using expert knowledge can be highly effective.</a:t>
             </a:r>
           </a:p>
           <a:p>
-            <a:endParaRPr/>
+            <a:pPr>
+              <a:buNone/>
+            </a:pPr>
+            <a:endParaRPr sz="1800" dirty="0"/>
           </a:p>
           <a:p>
             <a:pPr lvl="0" rtl="0">
               <a:buNone/>
             </a:pPr>
             <a:r>
-              <a:rPr lang="en" sz="2400"/>
+              <a:rPr lang="en" sz="2400" dirty="0"/>
               <a:t>- A good definition of error is often domain-specific.</a:t>
             </a:r>
           </a:p>
           <a:p>
-            <a:endParaRPr/>
+            <a:pPr>
+              <a:buNone/>
+            </a:pPr>
+            <a:endParaRPr sz="1800" dirty="0"/>
           </a:p>
           <a:p>
             <a:pPr lvl="0" rtl="0">
               <a:buNone/>
             </a:pPr>
             <a:r>
-              <a:rPr lang="en" sz="2400"/>
+              <a:rPr lang="en" sz="2400" dirty="0"/>
               <a:t>- Both decision tree and SVM were highly effective.</a:t>
             </a:r>
           </a:p>
           <a:p>
-            <a:endParaRPr/>
+            <a:pPr>
+              <a:buNone/>
+            </a:pPr>
+            <a:endParaRPr sz="1800" dirty="0"/>
           </a:p>
           <a:p>
             <a:pPr lvl="0" rtl="0">
               <a:buNone/>
             </a:pPr>
             <a:r>
-              <a:rPr lang="en" sz="2400"/>
+              <a:rPr lang="en" sz="2400" dirty="0"/>
               <a:t>- Decision tree outperformed SVM</a:t>
             </a:r>
           </a:p>
@@ -5918,7 +6292,7 @@
               <a:buNone/>
             </a:pPr>
             <a:r>
-              <a:rPr lang="en" sz="2400"/>
+              <a:rPr lang="en" sz="2400" dirty="0"/>
               <a:t>	- Somewhat better in terms of accuracy.</a:t>
             </a:r>
           </a:p>
@@ -5927,8 +6301,16 @@
               <a:buNone/>
             </a:pPr>
             <a:r>
-              <a:rPr lang="en" sz="2400"/>
-              <a:t>	- Much better in terms of speed.</a:t>
+              <a:rPr lang="en" sz="2400" dirty="0"/>
+              <a:t>	- Much better in terms of </a:t>
+            </a:r>
+            <a:r>
+              <a:rPr lang="en" sz="2400" dirty="0" smtClean="0"/>
+              <a:t>testing speed</a:t>
+            </a:r>
+            <a:r>
+              <a:rPr lang="en" sz="2400" dirty="0"/>
+              <a:t>.</a:t>
             </a:r>
           </a:p>
         </p:txBody>
@@ -5952,6 +6334,55 @@
 </file>
 
 <file path=ppt/tags/tag1.xml><?xml version="1.0" encoding="utf-8"?>
+<p:tagLst xmlns:a="http://schemas.openxmlformats.org/drawingml/2006/main" xmlns:r="http://schemas.openxmlformats.org/officeDocument/2006/relationships" xmlns:p="http://schemas.openxmlformats.org/presentationml/2006/main">
+  <p:tag name="LATEXADDIN" val="\documentclass{article}&#10;\usepackage{amsmath}&#10;\pagestyle{empty}&#10;\begin{document}&#10;&#10;\begin{equation*}&#10;\begin{aligned}&#10;y_i &amp;\in [-1,0,1,2,\dots,16]\\&#10;\mathbf{y} &amp;\in \mathbf{Z}^{28k \times 1}&#10;\end{aligned}&#10;\end{equation*}&#10;&#10;&#10;&#10;&#10;\end{document}"/>
+  <p:tag name="IGUANATEXSIZE" val="20"/>
+</p:tagLst>
+</file>
+
+<file path=ppt/tags/tag2.xml><?xml version="1.0" encoding="utf-8"?>
+<p:tagLst xmlns:a="http://schemas.openxmlformats.org/drawingml/2006/main" xmlns:r="http://schemas.openxmlformats.org/officeDocument/2006/relationships" xmlns:p="http://schemas.openxmlformats.org/presentationml/2006/main">
+  <p:tag name="LATEXADDIN" val="\documentclass{article}&#10;\usepackage{amsmath}&#10;\pagestyle{empty}&#10;\begin{document}&#10;&#10;$\left\|B_k-\text{corner}\right\|^2$&#10;&#10;\end{document}"/>
+  <p:tag name="IGUANATEXSIZE" val="20"/>
+</p:tagLst>
+</file>
+
+<file path=ppt/tags/tag3.xml><?xml version="1.0" encoding="utf-8"?>
+<p:tagLst xmlns:a="http://schemas.openxmlformats.org/drawingml/2006/main" xmlns:r="http://schemas.openxmlformats.org/officeDocument/2006/relationships" xmlns:p="http://schemas.openxmlformats.org/presentationml/2006/main">
+  <p:tag name="LATEXADDIN" val="\documentclass{article}&#10;\usepackage{amsmath}&#10;\pagestyle{empty}&#10;\begin{document}&#10;&#10;$\left\|B_k-\text{edge}\right\|^1$&#10;&#10;\end{document}"/>
+  <p:tag name="IGUANATEXSIZE" val="20"/>
+</p:tagLst>
+</file>
+
+<file path=ppt/tags/tag4.xml><?xml version="1.0" encoding="utf-8"?>
+<p:tagLst xmlns:a="http://schemas.openxmlformats.org/drawingml/2006/main" xmlns:r="http://schemas.openxmlformats.org/officeDocument/2006/relationships" xmlns:p="http://schemas.openxmlformats.org/presentationml/2006/main">
+  <p:tag name="LATEXADDIN" val="\documentclass{article}&#10;\usepackage{amsmath}&#10;\pagestyle{empty}&#10;\begin{document}&#10;&#10;$\left\|B_k-W_k \right\|^3$&#10;&#10;\end{document}"/>
+  <p:tag name="IGUANATEXSIZE" val="20"/>
+</p:tagLst>
+</file>
+
+<file path=ppt/tags/tag5.xml><?xml version="1.0" encoding="utf-8"?>
+<p:tagLst xmlns:a="http://schemas.openxmlformats.org/drawingml/2006/main" xmlns:r="http://schemas.openxmlformats.org/officeDocument/2006/relationships" xmlns:p="http://schemas.openxmlformats.org/presentationml/2006/main">
+  <p:tag name="LATEXADDIN" val="\documentclass{article}&#10;\usepackage{amsmath}&#10;\pagestyle{empty}&#10;\begin{document}&#10;&#10;$y_i = -1$&#10;&#10;\end{document}"/>
+  <p:tag name="IGUANATEXSIZE" val="20"/>
+</p:tagLst>
+</file>
+
+<file path=ppt/tags/tag6.xml><?xml version="1.0" encoding="utf-8"?>
+<p:tagLst xmlns:a="http://schemas.openxmlformats.org/drawingml/2006/main" xmlns:r="http://schemas.openxmlformats.org/officeDocument/2006/relationships" xmlns:p="http://schemas.openxmlformats.org/presentationml/2006/main">
+  <p:tag name="LATEXADDIN" val="\documentclass{article}&#10;\usepackage{amsmath}&#10;\pagestyle{empty}&#10;\begin{document}&#10;&#10;$y_i = 0$&#10;&#10;\end{document}"/>
+  <p:tag name="IGUANATEXSIZE" val="20"/>
+</p:tagLst>
+</file>
+
+<file path=ppt/tags/tag7.xml><?xml version="1.0" encoding="utf-8"?>
+<p:tagLst xmlns:a="http://schemas.openxmlformats.org/drawingml/2006/main" xmlns:r="http://schemas.openxmlformats.org/officeDocument/2006/relationships" xmlns:p="http://schemas.openxmlformats.org/presentationml/2006/main">
+  <p:tag name="LATEXADDIN" val="\documentclass{article}&#10;\usepackage{amsmath}&#10;\pagestyle{empty}&#10;\begin{document}&#10;&#10;$\mathbf{X} \in \mathbf{Z}^{28k \times 6} \Rightarrow \mathbf{X}_p \in \mathbf{R}^{28k \times 5}$ &#10;&#10;&#10;&#10;\end{document}"/>
+  <p:tag name="IGUANATEXSIZE" val="20"/>
+</p:tagLst>
+</file>
+
+<file path=ppt/tags/tag8.xml><?xml version="1.0" encoding="utf-8"?>
 <p:tagLst xmlns:a="http://schemas.openxmlformats.org/drawingml/2006/main" xmlns:r="http://schemas.openxmlformats.org/officeDocument/2006/relationships" xmlns:p="http://schemas.openxmlformats.org/presentationml/2006/main">
   <p:tag name="LATEXADDIN" val="\documentclass{article}&#10;\usepackage{amsmath}&#10;\pagestyle{empty}&#10;\begin{document}&#10;&#10;$O(1/\epsilon) \rightarrow (\mathbf{X} \in \mathbf{R}^{28k \times 5} &lt; 2 sec)$&#10;&#10;&#10;&#10;\end{document}"/>
   <p:tag name="IGUANATEXSIZE" val="20"/>

</xml_diff>